<commit_message>
Se anexaron los diagramas de flujo para los procesos de manufactura genericos.
</commit_message>
<xml_diff>
--- a/conferencia/Diseño y fabricación de una máquina Control Numérico.pptx
+++ b/conferencia/Diseño y fabricación de una máquina Control Numérico.pptx
@@ -3457,7 +3457,7 @@
           <a:p>
             <a:fld id="{93850E6D-2E01-4F88-960B-D9395EBAA5CF}" type="datetimeFigureOut">
               <a:rPr lang="es-NI" smtClean="0"/>
-              <a:t>14/11/2018</a:t>
+              <a:t>17/11/2018</a:t>
             </a:fld>
             <a:endParaRPr lang="es-NI"/>
           </a:p>
@@ -3627,7 +3627,7 @@
           <a:p>
             <a:fld id="{93850E6D-2E01-4F88-960B-D9395EBAA5CF}" type="datetimeFigureOut">
               <a:rPr lang="es-NI" smtClean="0"/>
-              <a:t>14/11/2018</a:t>
+              <a:t>17/11/2018</a:t>
             </a:fld>
             <a:endParaRPr lang="es-NI"/>
           </a:p>
@@ -3807,7 +3807,7 @@
           <a:p>
             <a:fld id="{93850E6D-2E01-4F88-960B-D9395EBAA5CF}" type="datetimeFigureOut">
               <a:rPr lang="es-NI" smtClean="0"/>
-              <a:t>14/11/2018</a:t>
+              <a:t>17/11/2018</a:t>
             </a:fld>
             <a:endParaRPr lang="es-NI"/>
           </a:p>
@@ -3977,7 +3977,7 @@
           <a:p>
             <a:fld id="{93850E6D-2E01-4F88-960B-D9395EBAA5CF}" type="datetimeFigureOut">
               <a:rPr lang="es-NI" smtClean="0"/>
-              <a:t>14/11/2018</a:t>
+              <a:t>17/11/2018</a:t>
             </a:fld>
             <a:endParaRPr lang="es-NI"/>
           </a:p>
@@ -4223,7 +4223,7 @@
           <a:p>
             <a:fld id="{93850E6D-2E01-4F88-960B-D9395EBAA5CF}" type="datetimeFigureOut">
               <a:rPr lang="es-NI" smtClean="0"/>
-              <a:t>14/11/2018</a:t>
+              <a:t>17/11/2018</a:t>
             </a:fld>
             <a:endParaRPr lang="es-NI"/>
           </a:p>
@@ -4455,7 +4455,7 @@
           <a:p>
             <a:fld id="{93850E6D-2E01-4F88-960B-D9395EBAA5CF}" type="datetimeFigureOut">
               <a:rPr lang="es-NI" smtClean="0"/>
-              <a:t>14/11/2018</a:t>
+              <a:t>17/11/2018</a:t>
             </a:fld>
             <a:endParaRPr lang="es-NI"/>
           </a:p>
@@ -4822,7 +4822,7 @@
           <a:p>
             <a:fld id="{93850E6D-2E01-4F88-960B-D9395EBAA5CF}" type="datetimeFigureOut">
               <a:rPr lang="es-NI" smtClean="0"/>
-              <a:t>14/11/2018</a:t>
+              <a:t>17/11/2018</a:t>
             </a:fld>
             <a:endParaRPr lang="es-NI"/>
           </a:p>
@@ -4940,7 +4940,7 @@
           <a:p>
             <a:fld id="{93850E6D-2E01-4F88-960B-D9395EBAA5CF}" type="datetimeFigureOut">
               <a:rPr lang="es-NI" smtClean="0"/>
-              <a:t>14/11/2018</a:t>
+              <a:t>17/11/2018</a:t>
             </a:fld>
             <a:endParaRPr lang="es-NI"/>
           </a:p>
@@ -5035,7 +5035,7 @@
           <a:p>
             <a:fld id="{93850E6D-2E01-4F88-960B-D9395EBAA5CF}" type="datetimeFigureOut">
               <a:rPr lang="es-NI" smtClean="0"/>
-              <a:t>14/11/2018</a:t>
+              <a:t>17/11/2018</a:t>
             </a:fld>
             <a:endParaRPr lang="es-NI"/>
           </a:p>
@@ -5312,7 +5312,7 @@
           <a:p>
             <a:fld id="{93850E6D-2E01-4F88-960B-D9395EBAA5CF}" type="datetimeFigureOut">
               <a:rPr lang="es-NI" smtClean="0"/>
-              <a:t>14/11/2018</a:t>
+              <a:t>17/11/2018</a:t>
             </a:fld>
             <a:endParaRPr lang="es-NI"/>
           </a:p>
@@ -5565,7 +5565,7 @@
           <a:p>
             <a:fld id="{93850E6D-2E01-4F88-960B-D9395EBAA5CF}" type="datetimeFigureOut">
               <a:rPr lang="es-NI" smtClean="0"/>
-              <a:t>14/11/2018</a:t>
+              <a:t>17/11/2018</a:t>
             </a:fld>
             <a:endParaRPr lang="es-NI"/>
           </a:p>
@@ -5778,7 +5778,7 @@
           <a:p>
             <a:fld id="{93850E6D-2E01-4F88-960B-D9395EBAA5CF}" type="datetimeFigureOut">
               <a:rPr lang="es-NI" smtClean="0"/>
-              <a:t>14/11/2018</a:t>
+              <a:t>17/11/2018</a:t>
             </a:fld>
             <a:endParaRPr lang="es-NI"/>
           </a:p>
@@ -6872,7 +6872,23 @@
             <a:pPr algn="just"/>
             <a:r>
               <a:rPr lang="es-NI" dirty="0" smtClean="0"/>
-              <a:t>Las máquinas de control numérico o CNC son el alma de la manufactura a gran escala por lo tanto decidimos hacer un esfuerzo en entender la tecnología con el fin de facilitar la comprensión de cómo y cuándo se deben utilizar, además de que planteamos una metodología de diseño mecánico la cual hemos ido refinando a lo largo de los proyectos en los que hemos trabajado dejando en esta investigación nuestras conclusiones de cómo se debe elaborar un producto en este caso un CNC siendo esta investigación un arma de doble filo en donde se plantean los medios(Manufactura en máquinas CNC) para llevar a cabo el fin(Producto) que se proponga. </a:t>
+              <a:t>Las máquinas de control numérico o CNC son el alma de la manufactura a gran escala por lo tanto decidimos hacer un esfuerzo en entender la tecnología con el fin de facilitar la comprensión de cómo y cuándo se deben utilizar, además de que planteamos una metodología de diseño mecánico la cual hemos ido refinando a lo largo de los proyectos en los que hemos trabajado dejando en esta investigación nuestras conclusiones de cómo se debe elaborar un producto en este caso un CNC siendo </a:t>
+            </a:r>
+            <a:r>
+              <a:rPr lang="es-NI" dirty="0" smtClean="0"/>
+              <a:t>este estudio </a:t>
+            </a:r>
+            <a:r>
+              <a:rPr lang="es-NI" dirty="0" smtClean="0"/>
+              <a:t>un arma de doble filo en donde se plantean los </a:t>
+            </a:r>
+            <a:r>
+              <a:rPr lang="es-NI" dirty="0" smtClean="0"/>
+              <a:t>medios (</a:t>
+            </a:r>
+            <a:r>
+              <a:rPr lang="es-NI" dirty="0" smtClean="0"/>
+              <a:t>Manufactura en máquinas CNC) para llevar a cabo el fin(Producto) que se proponga. </a:t>
             </a:r>
             <a:endParaRPr lang="es-NI" dirty="0"/>
           </a:p>
@@ -6997,6 +7013,7 @@
           <a:bodyPr/>
           <a:lstStyle/>
           <a:p>
+            <a:pPr algn="just"/>
             <a:r>
               <a:rPr lang="es-ES" dirty="0"/>
               <a:t>El control numérico computarizado es el uso de una computadora para controlar y monitorear los movimientos de una máquina </a:t>
@@ -7007,6 +7024,7 @@
             </a:r>
           </a:p>
           <a:p>
+            <a:pPr algn="just"/>
             <a:r>
               <a:rPr lang="es-ES" dirty="0"/>
               <a:t>Todas las máquinas CNC comparten una característica en común: tienen dos o más direcciones programables de movimiento llamadas </a:t>
@@ -8169,12 +8187,14 @@
           <a:bodyPr/>
           <a:lstStyle/>
           <a:p>
+            <a:pPr algn="just"/>
             <a:r>
               <a:rPr lang="es-NI" dirty="0" smtClean="0"/>
               <a:t>Con el fin de agilizar el proceso de diseño proponemos el uso de programas CAD/CAM dado que facilita las fases de evaluación y optimización de los productos diseñados.</a:t>
             </a:r>
           </a:p>
           <a:p>
+            <a:pPr algn="just"/>
             <a:r>
               <a:rPr lang="es-NI" dirty="0" smtClean="0"/>
               <a:t>Programas como </a:t>
@@ -8309,12 +8329,14 @@
           <a:bodyPr/>
           <a:lstStyle/>
           <a:p>
+            <a:pPr algn="just"/>
             <a:r>
               <a:rPr lang="es-NI" dirty="0" smtClean="0"/>
               <a:t>Todo buen diseño contempla la facilidad de manufactura sin sacrificar la funcionalidad del dispositivo.</a:t>
             </a:r>
           </a:p>
           <a:p>
+            <a:pPr algn="just"/>
             <a:r>
               <a:rPr lang="es-NI" dirty="0" smtClean="0"/>
               <a:t>La clave es seleccionar los procesos de fabricación adecuados</a:t>
@@ -8446,9 +8468,18 @@
           </a:bodyPr>
           <a:lstStyle/>
           <a:p>
+            <a:pPr algn="just"/>
             <a:r>
               <a:rPr lang="es-NI" dirty="0" smtClean="0"/>
-              <a:t>A medida que la complejidad de los proyectos va aumentado se va haciendo necesaria una mayor cantidad de iteraciones para poder lograr los objetivos deseados en nuestros productos por lo tanto en este proyecto se ha implementado un control de versiones(GIT) a fin de documentar el proyecto de comienzo a fin y monitorear el avance.</a:t>
+              <a:t>A medida que la complejidad de los proyectos va aumentado se va haciendo necesaria una mayor cantidad de iteraciones para poder lograr los objetivos deseados en nuestros productos por lo tanto en este proyecto se ha implementado un control de </a:t>
+            </a:r>
+            <a:r>
+              <a:rPr lang="es-NI" dirty="0" smtClean="0"/>
+              <a:t>versiones (</a:t>
+            </a:r>
+            <a:r>
+              <a:rPr lang="es-NI" dirty="0" smtClean="0"/>
+              <a:t>GIT) a fin de documentar el proyecto de comienzo a fin y monitorear el avance.</a:t>
             </a:r>
             <a:endParaRPr lang="es-NI" dirty="0"/>
           </a:p>
@@ -8600,20 +8631,24 @@
           <a:bodyPr/>
           <a:lstStyle/>
           <a:p>
-            <a:pPr marL="0" indent="0">
+            <a:pPr marL="0" indent="0" algn="just">
               <a:buNone/>
             </a:pPr>
             <a:r>
               <a:rPr lang="es-NI" dirty="0" smtClean="0"/>
-              <a:t>No se puede medir lo que no se ha planeado y dada esta premisa </a:t>
+              <a:t>No se puede medir lo que no se ha planeado y dada esta premisa se ha decidido emplear una herramienta de </a:t>
+            </a:r>
+            <a:r>
+              <a:rPr lang="es-NI" dirty="0" err="1" smtClean="0"/>
+              <a:t>administracion</a:t>
             </a:r>
             <a:r>
               <a:rPr lang="es-NI" dirty="0" smtClean="0"/>
-              <a:t>se ha </a:t>
+              <a:t> </a:t>
             </a:r>
             <a:r>
               <a:rPr lang="es-NI" dirty="0" smtClean="0"/>
-              <a:t>decidido emplear una herramienta de gestión de personal a fin de agilizar los diferentes procesos que conlleva el diseño y fabricación de una maquina.</a:t>
+              <a:t>de personal a fin de agilizar los diferentes procesos que conlleva el diseño y fabricación de una maquina.</a:t>
             </a:r>
           </a:p>
         </p:txBody>

</xml_diff>

<commit_message>
se reviso la diapositiva de la conferencia
</commit_message>
<xml_diff>
--- a/conferencia/Diseño y fabricación de una máquina Control Numérico.pptx
+++ b/conferencia/Diseño y fabricación de una máquina Control Numérico.pptx
@@ -3457,7 +3457,7 @@
           <a:p>
             <a:fld id="{93850E6D-2E01-4F88-960B-D9395EBAA5CF}" type="datetimeFigureOut">
               <a:rPr lang="es-NI" smtClean="0"/>
-              <a:t>17/11/2018</a:t>
+              <a:t>11/12/2018</a:t>
             </a:fld>
             <a:endParaRPr lang="es-NI"/>
           </a:p>
@@ -3627,7 +3627,7 @@
           <a:p>
             <a:fld id="{93850E6D-2E01-4F88-960B-D9395EBAA5CF}" type="datetimeFigureOut">
               <a:rPr lang="es-NI" smtClean="0"/>
-              <a:t>17/11/2018</a:t>
+              <a:t>11/12/2018</a:t>
             </a:fld>
             <a:endParaRPr lang="es-NI"/>
           </a:p>
@@ -3807,7 +3807,7 @@
           <a:p>
             <a:fld id="{93850E6D-2E01-4F88-960B-D9395EBAA5CF}" type="datetimeFigureOut">
               <a:rPr lang="es-NI" smtClean="0"/>
-              <a:t>17/11/2018</a:t>
+              <a:t>11/12/2018</a:t>
             </a:fld>
             <a:endParaRPr lang="es-NI"/>
           </a:p>
@@ -3977,7 +3977,7 @@
           <a:p>
             <a:fld id="{93850E6D-2E01-4F88-960B-D9395EBAA5CF}" type="datetimeFigureOut">
               <a:rPr lang="es-NI" smtClean="0"/>
-              <a:t>17/11/2018</a:t>
+              <a:t>11/12/2018</a:t>
             </a:fld>
             <a:endParaRPr lang="es-NI"/>
           </a:p>
@@ -4223,7 +4223,7 @@
           <a:p>
             <a:fld id="{93850E6D-2E01-4F88-960B-D9395EBAA5CF}" type="datetimeFigureOut">
               <a:rPr lang="es-NI" smtClean="0"/>
-              <a:t>17/11/2018</a:t>
+              <a:t>11/12/2018</a:t>
             </a:fld>
             <a:endParaRPr lang="es-NI"/>
           </a:p>
@@ -4455,7 +4455,7 @@
           <a:p>
             <a:fld id="{93850E6D-2E01-4F88-960B-D9395EBAA5CF}" type="datetimeFigureOut">
               <a:rPr lang="es-NI" smtClean="0"/>
-              <a:t>17/11/2018</a:t>
+              <a:t>11/12/2018</a:t>
             </a:fld>
             <a:endParaRPr lang="es-NI"/>
           </a:p>
@@ -4822,7 +4822,7 @@
           <a:p>
             <a:fld id="{93850E6D-2E01-4F88-960B-D9395EBAA5CF}" type="datetimeFigureOut">
               <a:rPr lang="es-NI" smtClean="0"/>
-              <a:t>17/11/2018</a:t>
+              <a:t>11/12/2018</a:t>
             </a:fld>
             <a:endParaRPr lang="es-NI"/>
           </a:p>
@@ -4940,7 +4940,7 @@
           <a:p>
             <a:fld id="{93850E6D-2E01-4F88-960B-D9395EBAA5CF}" type="datetimeFigureOut">
               <a:rPr lang="es-NI" smtClean="0"/>
-              <a:t>17/11/2018</a:t>
+              <a:t>11/12/2018</a:t>
             </a:fld>
             <a:endParaRPr lang="es-NI"/>
           </a:p>
@@ -5035,7 +5035,7 @@
           <a:p>
             <a:fld id="{93850E6D-2E01-4F88-960B-D9395EBAA5CF}" type="datetimeFigureOut">
               <a:rPr lang="es-NI" smtClean="0"/>
-              <a:t>17/11/2018</a:t>
+              <a:t>11/12/2018</a:t>
             </a:fld>
             <a:endParaRPr lang="es-NI"/>
           </a:p>
@@ -5312,7 +5312,7 @@
           <a:p>
             <a:fld id="{93850E6D-2E01-4F88-960B-D9395EBAA5CF}" type="datetimeFigureOut">
               <a:rPr lang="es-NI" smtClean="0"/>
-              <a:t>17/11/2018</a:t>
+              <a:t>11/12/2018</a:t>
             </a:fld>
             <a:endParaRPr lang="es-NI"/>
           </a:p>
@@ -5565,7 +5565,7 @@
           <a:p>
             <a:fld id="{93850E6D-2E01-4F88-960B-D9395EBAA5CF}" type="datetimeFigureOut">
               <a:rPr lang="es-NI" smtClean="0"/>
-              <a:t>17/11/2018</a:t>
+              <a:t>11/12/2018</a:t>
             </a:fld>
             <a:endParaRPr lang="es-NI"/>
           </a:p>
@@ -5778,7 +5778,7 @@
           <a:p>
             <a:fld id="{93850E6D-2E01-4F88-960B-D9395EBAA5CF}" type="datetimeFigureOut">
               <a:rPr lang="es-NI" smtClean="0"/>
-              <a:t>17/11/2018</a:t>
+              <a:t>11/12/2018</a:t>
             </a:fld>
             <a:endParaRPr lang="es-NI"/>
           </a:p>
@@ -6872,23 +6872,91 @@
             <a:pPr algn="just"/>
             <a:r>
               <a:rPr lang="es-NI" dirty="0" smtClean="0"/>
-              <a:t>Las máquinas de control numérico o CNC son el alma de la manufactura a gran escala por lo tanto decidimos hacer un esfuerzo en entender la tecnología con el fin de facilitar la comprensión de cómo y cuándo se deben utilizar, además de que planteamos una metodología de diseño mecánico la cual hemos ido refinando a lo largo de los proyectos en los que hemos trabajado dejando en esta investigación nuestras conclusiones de cómo se debe elaborar un producto en este caso un CNC siendo </a:t>
+              <a:t>Las máquinas de control numérico o CNC son el alma de la manufactura a gran escala por lo tanto </a:t>
             </a:r>
             <a:r>
               <a:rPr lang="es-NI" dirty="0" smtClean="0"/>
-              <a:t>este estudio </a:t>
+              <a:t>se decidió</a:t>
             </a:r>
             <a:r>
               <a:rPr lang="es-NI" dirty="0" smtClean="0"/>
-              <a:t>un arma de doble filo en donde se plantean los </a:t>
+              <a:t> </a:t>
             </a:r>
             <a:r>
               <a:rPr lang="es-NI" dirty="0" smtClean="0"/>
-              <a:t>medios (</a:t>
+              <a:t>hacer un esfuerzo en entender la tecnología con el fin de facilitar la comprensión de cómo y cuándo se deben utilizar, además de que </a:t>
             </a:r>
             <a:r>
               <a:rPr lang="es-NI" dirty="0" smtClean="0"/>
-              <a:t>Manufactura en máquinas CNC) para llevar a cabo el fin(Producto) que se proponga. </a:t>
+              <a:t>se planteó </a:t>
+            </a:r>
+            <a:r>
+              <a:rPr lang="es-NI" dirty="0" smtClean="0"/>
+              <a:t>una metodología de diseño mecánico la cual </a:t>
+            </a:r>
+            <a:r>
+              <a:rPr lang="es-NI" dirty="0" smtClean="0"/>
+              <a:t>se ha</a:t>
+            </a:r>
+            <a:r>
+              <a:rPr lang="es-NI" dirty="0" smtClean="0"/>
+              <a:t> </a:t>
+            </a:r>
+            <a:r>
+              <a:rPr lang="es-NI" dirty="0" smtClean="0"/>
+              <a:t>ido refinando a lo largo de los proyectos en los que </a:t>
+            </a:r>
+            <a:r>
+              <a:rPr lang="es-NI" dirty="0" smtClean="0"/>
+              <a:t>se han trabajado, </a:t>
+            </a:r>
+            <a:r>
+              <a:rPr lang="es-NI" dirty="0" smtClean="0"/>
+              <a:t>dejando en esta investigación </a:t>
+            </a:r>
+            <a:r>
+              <a:rPr lang="es-NI" dirty="0"/>
+              <a:t>l</a:t>
+            </a:r>
+            <a:r>
+              <a:rPr lang="es-NI" dirty="0" smtClean="0"/>
+              <a:t>as </a:t>
+            </a:r>
+            <a:r>
+              <a:rPr lang="es-NI" dirty="0" smtClean="0"/>
+              <a:t>conclusiones de cómo se debe elaborar un </a:t>
+            </a:r>
+            <a:r>
+              <a:rPr lang="es-NI" dirty="0" smtClean="0"/>
+              <a:t>producto, </a:t>
+            </a:r>
+            <a:r>
+              <a:rPr lang="es-NI" dirty="0" smtClean="0"/>
+              <a:t>en este caso un CNC siendo </a:t>
+            </a:r>
+            <a:r>
+              <a:rPr lang="es-NI" dirty="0" smtClean="0"/>
+              <a:t>este </a:t>
+            </a:r>
+            <a:r>
+              <a:rPr lang="es-NI" dirty="0" smtClean="0"/>
+              <a:t>estudio un arma de </a:t>
+            </a:r>
+            <a:r>
+              <a:rPr lang="es-NI" dirty="0" smtClean="0"/>
+              <a:t>doble </a:t>
+            </a:r>
+            <a:r>
+              <a:rPr lang="es-NI" dirty="0" smtClean="0"/>
+              <a:t>filo en donde se plantean los medios (Manufactura en máquinas CNC) para llevar a cabo el </a:t>
+            </a:r>
+            <a:r>
+              <a:rPr lang="es-NI" dirty="0" smtClean="0"/>
+              <a:t>fin (</a:t>
+            </a:r>
+            <a:r>
+              <a:rPr lang="es-NI" dirty="0" smtClean="0"/>
+              <a:t>Producto) que se proponga. </a:t>
             </a:r>
             <a:endParaRPr lang="es-NI" dirty="0"/>
           </a:p>
@@ -8190,7 +8258,15 @@
             <a:pPr algn="just"/>
             <a:r>
               <a:rPr lang="es-NI" dirty="0" smtClean="0"/>
-              <a:t>Con el fin de agilizar el proceso de diseño proponemos el uso de programas CAD/CAM dado que facilita las fases de evaluación y optimización de los productos diseñados.</a:t>
+              <a:t>Con el fin de agilizar el proceso de diseño </a:t>
+            </a:r>
+            <a:r>
+              <a:rPr lang="es-NI" dirty="0" smtClean="0"/>
+              <a:t>se propone </a:t>
+            </a:r>
+            <a:r>
+              <a:rPr lang="es-NI" dirty="0" smtClean="0"/>
+              <a:t>el uso de programas CAD/CAM dado que facilita las fases de evaluación y optimización de los productos diseñados.</a:t>
             </a:r>
           </a:p>
           <a:p>
@@ -8200,12 +8276,16 @@
               <a:t>Programas como </a:t>
             </a:r>
             <a:r>
-              <a:rPr lang="es-NI" dirty="0"/>
-              <a:t>S</a:t>
+              <a:rPr lang="es-NI" dirty="0" err="1" smtClean="0"/>
+              <a:t>Solidworks</a:t>
             </a:r>
             <a:r>
               <a:rPr lang="es-NI" dirty="0" smtClean="0"/>
-              <a:t>olidworks ,Inventor o Fusión 360 son muy buenas opciones.</a:t>
+              <a:t>, Inventor </a:t>
+            </a:r>
+            <a:r>
+              <a:rPr lang="es-NI" dirty="0" smtClean="0"/>
+              <a:t>o Fusión 360 son muy buenas opciones.</a:t>
             </a:r>
             <a:endParaRPr lang="es-NI" dirty="0"/>
           </a:p>
@@ -8347,7 +8427,23 @@
             </a:r>
             <a:r>
               <a:rPr lang="es-NI" dirty="0" smtClean="0"/>
-              <a:t> y esa es la razón por la que decidimos construir un CNC, debido a la versatilidad que este nos ofrece.</a:t>
+              <a:t> y esa es la razón por la que </a:t>
+            </a:r>
+            <a:r>
+              <a:rPr lang="es-NI" dirty="0" smtClean="0"/>
+              <a:t>se decidió </a:t>
+            </a:r>
+            <a:r>
+              <a:rPr lang="es-NI" dirty="0" smtClean="0"/>
+              <a:t>construir un CNC, debido a la versatilidad que </a:t>
+            </a:r>
+            <a:r>
+              <a:rPr lang="es-NI" dirty="0" smtClean="0"/>
+              <a:t>este </a:t>
+            </a:r>
+            <a:r>
+              <a:rPr lang="es-NI" dirty="0" smtClean="0"/>
+              <a:t>ofrece.</a:t>
             </a:r>
             <a:endParaRPr lang="es-NI" dirty="0"/>
           </a:p>
@@ -8471,15 +8567,27 @@
             <a:pPr algn="just"/>
             <a:r>
               <a:rPr lang="es-NI" dirty="0" smtClean="0"/>
-              <a:t>A medida que la complejidad de los proyectos va aumentado se va haciendo necesaria una mayor cantidad de iteraciones para poder lograr los objetivos deseados en nuestros productos por lo tanto en este proyecto se ha implementado un control de </a:t>
+              <a:t>A medida que la complejidad de los proyectos va aumentado se va haciendo necesaria una mayor cantidad de iteraciones para poder lograr los objetivos deseados en </a:t>
             </a:r>
             <a:r>
               <a:rPr lang="es-NI" dirty="0" smtClean="0"/>
-              <a:t>versiones (</a:t>
+              <a:t>los</a:t>
             </a:r>
             <a:r>
               <a:rPr lang="es-NI" dirty="0" smtClean="0"/>
-              <a:t>GIT) a fin de documentar el proyecto de comienzo a fin y monitorear el avance.</a:t>
+              <a:t> productos, </a:t>
+            </a:r>
+            <a:r>
+              <a:rPr lang="es-NI" dirty="0" smtClean="0"/>
+              <a:t>por lo </a:t>
+            </a:r>
+            <a:r>
+              <a:rPr lang="es-NI" dirty="0" smtClean="0"/>
+              <a:t>tanto, </a:t>
+            </a:r>
+            <a:r>
+              <a:rPr lang="es-NI" dirty="0" smtClean="0"/>
+              <a:t>en este proyecto se ha implementado un control de versiones (GIT) a fin de documentar el proyecto de comienzo a fin y monitorear el avance.</a:t>
             </a:r>
             <a:endParaRPr lang="es-NI" dirty="0"/>
           </a:p>
@@ -8639,12 +8747,8 @@
               <a:t>No se puede medir lo que no se ha planeado y dada esta premisa se ha decidido emplear una herramienta de </a:t>
             </a:r>
             <a:r>
-              <a:rPr lang="es-NI" dirty="0" err="1" smtClean="0"/>
-              <a:t>administracion</a:t>
-            </a:r>
-            <a:r>
               <a:rPr lang="es-NI" dirty="0" smtClean="0"/>
-              <a:t> </a:t>
+              <a:t>administración </a:t>
             </a:r>
             <a:r>
               <a:rPr lang="es-NI" dirty="0" smtClean="0"/>

</xml_diff>